<commit_message>
Update Introduction to Machine Learning.pptx
</commit_message>
<xml_diff>
--- a/Introduction-to-Machine-Learning/Introduction to Machine Learning.pptx
+++ b/Introduction-to-Machine-Learning/Introduction to Machine Learning.pptx
@@ -4034,9 +4034,6 @@
               </a:rPr>
               <a:t>What is Machine Learning?</a:t>
             </a:r>
-            <a:endParaRPr lang="en-US" sz="3200" smtClean="0">
-              <a:latin typeface="Arial Rounded MT Bold" panose="020F0704030504030204" pitchFamily="34" charset="0"/>
-            </a:endParaRPr>
           </a:p>
           <a:p>
             <a:pPr marL="971550" indent="-971550">
@@ -4049,9 +4046,6 @@
               </a:rPr>
               <a:t>Performance Measures</a:t>
             </a:r>
-            <a:endParaRPr lang="en-US" sz="3200" smtClean="0">
-              <a:latin typeface="Arial Rounded MT Bold" panose="020F0704030504030204" pitchFamily="34" charset="0"/>
-            </a:endParaRPr>
           </a:p>
           <a:p>
             <a:pPr marL="971550" indent="-971550">
@@ -4064,9 +4058,6 @@
               </a:rPr>
               <a:t>Classification</a:t>
             </a:r>
-            <a:endParaRPr lang="en-US" sz="3200" smtClean="0">
-              <a:latin typeface="Arial Rounded MT Bold" panose="020F0704030504030204" pitchFamily="34" charset="0"/>
-            </a:endParaRPr>
           </a:p>
           <a:p>
             <a:pPr marL="971550" indent="-971550">
@@ -4268,7 +4259,7 @@
         </p:nvGrpSpPr>
         <p:grpSpPr>
           <a:xfrm>
-            <a:off x="1371600" y="2905234"/>
+            <a:off x="1371600" y="2904313"/>
             <a:ext cx="9746766" cy="369332"/>
             <a:chOff x="1279822" y="3765833"/>
             <a:chExt cx="9746766" cy="369332"/>
@@ -5175,6 +5166,68 @@
           <a:chExt cx="0" cy="0"/>
         </a:xfrm>
       </p:grpSpPr>
+      <p:pic>
+        <p:nvPicPr>
+          <p:cNvPr id="13" name="Picture 12"/>
+          <p:cNvPicPr>
+            <a:picLocks noChangeAspect="1"/>
+          </p:cNvPicPr>
+          <p:nvPr/>
+        </p:nvPicPr>
+        <p:blipFill>
+          <a:blip r:embed="rId2"/>
+          <a:stretch>
+            <a:fillRect/>
+          </a:stretch>
+        </p:blipFill>
+        <p:spPr>
+          <a:xfrm>
+            <a:off x="1410487" y="3277452"/>
+            <a:ext cx="1421945" cy="1978621"/>
+          </a:xfrm>
+          <a:prstGeom prst="rect">
+            <a:avLst/>
+          </a:prstGeom>
+        </p:spPr>
+      </p:pic>
+      <p:cxnSp>
+        <p:nvCxnSpPr>
+          <p:cNvPr id="18" name="Elbow Connector 17"/>
+          <p:cNvCxnSpPr>
+            <a:stCxn id="21" idx="0"/>
+            <a:endCxn id="19" idx="0"/>
+          </p:cNvCxnSpPr>
+          <p:nvPr/>
+        </p:nvCxnSpPr>
+        <p:spPr>
+          <a:xfrm rot="16200000" flipH="1">
+            <a:off x="3564141" y="2036438"/>
+            <a:ext cx="389671" cy="2860542"/>
+          </a:xfrm>
+          <a:prstGeom prst="bentConnector3">
+            <a:avLst>
+              <a:gd name="adj1" fmla="val -29524"/>
+            </a:avLst>
+          </a:prstGeom>
+          <a:ln>
+            <a:tailEnd type="triangle"/>
+          </a:ln>
+        </p:spPr>
+        <p:style>
+          <a:lnRef idx="1">
+            <a:schemeClr val="accent1"/>
+          </a:lnRef>
+          <a:fillRef idx="0">
+            <a:schemeClr val="accent1"/>
+          </a:fillRef>
+          <a:effectRef idx="0">
+            <a:schemeClr val="accent1"/>
+          </a:effectRef>
+          <a:fontRef idx="minor">
+            <a:schemeClr val="tx1"/>
+          </a:fontRef>
+        </p:style>
+      </p:cxnSp>
       <p:sp>
         <p:nvSpPr>
           <p:cNvPr id="2" name="Title 1"/>
@@ -5324,7 +5377,7 @@
         </p:nvGrpSpPr>
         <p:grpSpPr>
           <a:xfrm>
-            <a:off x="1371600" y="2905234"/>
+            <a:off x="1371600" y="2704158"/>
             <a:ext cx="9746766" cy="369332"/>
             <a:chOff x="1279822" y="3765833"/>
             <a:chExt cx="9746766" cy="369332"/>
@@ -5340,8 +5393,8 @@
           </p:nvCxnSpPr>
           <p:spPr>
             <a:xfrm>
-              <a:off x="4596243" y="3950499"/>
-              <a:ext cx="6430345" cy="0"/>
+              <a:off x="5097470" y="3950499"/>
+              <a:ext cx="5929118" cy="0"/>
             </a:xfrm>
             <a:prstGeom prst="line">
               <a:avLst/>
@@ -5371,7 +5424,7 @@
           <p:spPr>
             <a:xfrm>
               <a:off x="1279822" y="3765833"/>
-              <a:ext cx="3316421" cy="369332"/>
+              <a:ext cx="3817648" cy="369332"/>
             </a:xfrm>
             <a:prstGeom prst="rect">
               <a:avLst/>
@@ -5390,7 +5443,15 @@
                     <a:srgbClr val="00B0F0"/>
                   </a:solidFill>
                 </a:rPr>
-                <a:t>Applied R (Studying Information)</a:t>
+                <a:t>Applied R </a:t>
+              </a:r>
+              <a:r>
+                <a:rPr lang="en-US" b="1" smtClean="0">
+                  <a:solidFill>
+                    <a:srgbClr val="00B0F0"/>
+                  </a:solidFill>
+                </a:rPr>
+                <a:t>(Classification: Filter Spam)</a:t>
               </a:r>
               <a:endParaRPr lang="en-US" b="1">
                 <a:solidFill>
@@ -5401,6 +5462,561 @@
           </p:txBody>
         </p:sp>
       </p:grpSp>
+      <p:sp>
+        <p:nvSpPr>
+          <p:cNvPr id="9" name="TextBox 8"/>
+          <p:cNvSpPr txBox="1"/>
+          <p:nvPr/>
+        </p:nvSpPr>
+        <p:spPr>
+          <a:xfrm>
+            <a:off x="2622735" y="5814894"/>
+            <a:ext cx="899875" cy="577081"/>
+          </a:xfrm>
+          <a:prstGeom prst="rect">
+            <a:avLst/>
+          </a:prstGeom>
+          <a:noFill/>
+        </p:spPr>
+        <p:txBody>
+          <a:bodyPr wrap="square" rtlCol="0">
+            <a:spAutoFit/>
+          </a:bodyPr>
+          <a:lstStyle/>
+          <a:p>
+            <a:pPr algn="ctr"/>
+            <a:r>
+              <a:rPr lang="en-US" sz="1050" smtClean="0">
+                <a:solidFill>
+                  <a:srgbClr val="C00000"/>
+                </a:solidFill>
+                <a:latin typeface="Arial" panose="020B0604020202020204" pitchFamily="34" charset="0"/>
+                <a:cs typeface="Arial" panose="020B0604020202020204" pitchFamily="34" charset="0"/>
+              </a:rPr>
+              <a:t>label on observed data</a:t>
+            </a:r>
+            <a:endParaRPr lang="en-US" sz="1050">
+              <a:solidFill>
+                <a:srgbClr val="C00000"/>
+              </a:solidFill>
+              <a:latin typeface="Arial" panose="020B0604020202020204" pitchFamily="34" charset="0"/>
+              <a:cs typeface="Arial" panose="020B0604020202020204" pitchFamily="34" charset="0"/>
+            </a:endParaRPr>
+          </a:p>
+        </p:txBody>
+      </p:sp>
+      <p:cxnSp>
+        <p:nvCxnSpPr>
+          <p:cNvPr id="10" name="Straight Arrow Connector 9"/>
+          <p:cNvCxnSpPr>
+            <a:stCxn id="9" idx="0"/>
+          </p:cNvCxnSpPr>
+          <p:nvPr/>
+        </p:nvCxnSpPr>
+        <p:spPr>
+          <a:xfrm flipH="1" flipV="1">
+            <a:off x="2778643" y="5285958"/>
+            <a:ext cx="294030" cy="528936"/>
+          </a:xfrm>
+          <a:prstGeom prst="straightConnector1">
+            <a:avLst/>
+          </a:prstGeom>
+          <a:ln>
+            <a:tailEnd type="triangle"/>
+          </a:ln>
+        </p:spPr>
+        <p:style>
+          <a:lnRef idx="1">
+            <a:schemeClr val="accent1"/>
+          </a:lnRef>
+          <a:fillRef idx="0">
+            <a:schemeClr val="accent1"/>
+          </a:fillRef>
+          <a:effectRef idx="0">
+            <a:schemeClr val="accent1"/>
+          </a:effectRef>
+          <a:fontRef idx="minor">
+            <a:schemeClr val="tx1"/>
+          </a:fontRef>
+        </p:style>
+      </p:cxnSp>
+      <p:sp>
+        <p:nvSpPr>
+          <p:cNvPr id="11" name="TextBox 10"/>
+          <p:cNvSpPr txBox="1"/>
+          <p:nvPr/>
+        </p:nvSpPr>
+        <p:spPr>
+          <a:xfrm>
+            <a:off x="1428831" y="5878308"/>
+            <a:ext cx="899875" cy="415498"/>
+          </a:xfrm>
+          <a:prstGeom prst="rect">
+            <a:avLst/>
+          </a:prstGeom>
+          <a:noFill/>
+        </p:spPr>
+        <p:txBody>
+          <a:bodyPr wrap="square" rtlCol="0">
+            <a:spAutoFit/>
+          </a:bodyPr>
+          <a:lstStyle/>
+          <a:p>
+            <a:pPr algn="ctr"/>
+            <a:r>
+              <a:rPr lang="en-US" sz="1050" smtClean="0">
+                <a:solidFill>
+                  <a:srgbClr val="C00000"/>
+                </a:solidFill>
+                <a:latin typeface="Arial" panose="020B0604020202020204" pitchFamily="34" charset="0"/>
+                <a:cs typeface="Arial" panose="020B0604020202020204" pitchFamily="34" charset="0"/>
+              </a:rPr>
+              <a:t>feature vector</a:t>
+            </a:r>
+            <a:endParaRPr lang="en-US" sz="1050">
+              <a:solidFill>
+                <a:srgbClr val="C00000"/>
+              </a:solidFill>
+              <a:latin typeface="Arial" panose="020B0604020202020204" pitchFamily="34" charset="0"/>
+              <a:cs typeface="Arial" panose="020B0604020202020204" pitchFamily="34" charset="0"/>
+            </a:endParaRPr>
+          </a:p>
+        </p:txBody>
+      </p:sp>
+      <p:cxnSp>
+        <p:nvCxnSpPr>
+          <p:cNvPr id="12" name="Straight Arrow Connector 11"/>
+          <p:cNvCxnSpPr>
+            <a:stCxn id="11" idx="0"/>
+          </p:cNvCxnSpPr>
+          <p:nvPr/>
+        </p:nvCxnSpPr>
+        <p:spPr>
+          <a:xfrm flipV="1">
+            <a:off x="1878769" y="5285958"/>
+            <a:ext cx="480021" cy="592350"/>
+          </a:xfrm>
+          <a:prstGeom prst="straightConnector1">
+            <a:avLst/>
+          </a:prstGeom>
+          <a:ln>
+            <a:tailEnd type="triangle"/>
+          </a:ln>
+        </p:spPr>
+        <p:style>
+          <a:lnRef idx="1">
+            <a:schemeClr val="accent1"/>
+          </a:lnRef>
+          <a:fillRef idx="0">
+            <a:schemeClr val="accent1"/>
+          </a:fillRef>
+          <a:effectRef idx="0">
+            <a:schemeClr val="accent1"/>
+          </a:effectRef>
+          <a:fontRef idx="minor">
+            <a:schemeClr val="tx1"/>
+          </a:fontRef>
+        </p:style>
+      </p:cxnSp>
+      <p:pic>
+        <p:nvPicPr>
+          <p:cNvPr id="15" name="Picture 14"/>
+          <p:cNvPicPr>
+            <a:picLocks noChangeAspect="1"/>
+          </p:cNvPicPr>
+          <p:nvPr/>
+        </p:nvPicPr>
+        <p:blipFill>
+          <a:blip r:embed="rId3"/>
+          <a:stretch>
+            <a:fillRect/>
+          </a:stretch>
+        </p:blipFill>
+        <p:spPr>
+          <a:xfrm>
+            <a:off x="3478306" y="3661545"/>
+            <a:ext cx="3527238" cy="1210434"/>
+          </a:xfrm>
+          <a:prstGeom prst="rect">
+            <a:avLst/>
+          </a:prstGeom>
+        </p:spPr>
+      </p:pic>
+      <p:sp>
+        <p:nvSpPr>
+          <p:cNvPr id="16" name="TextBox 15"/>
+          <p:cNvSpPr txBox="1"/>
+          <p:nvPr/>
+        </p:nvSpPr>
+        <p:spPr>
+          <a:xfrm>
+            <a:off x="4791987" y="4871979"/>
+            <a:ext cx="899875" cy="253916"/>
+          </a:xfrm>
+          <a:prstGeom prst="rect">
+            <a:avLst/>
+          </a:prstGeom>
+          <a:noFill/>
+        </p:spPr>
+        <p:txBody>
+          <a:bodyPr wrap="square" rtlCol="0">
+            <a:spAutoFit/>
+          </a:bodyPr>
+          <a:lstStyle/>
+          <a:p>
+            <a:pPr algn="ctr"/>
+            <a:r>
+              <a:rPr lang="en-US" sz="1050" smtClean="0">
+                <a:solidFill>
+                  <a:srgbClr val="C00000"/>
+                </a:solidFill>
+                <a:latin typeface="Arial" panose="020B0604020202020204" pitchFamily="34" charset="0"/>
+                <a:cs typeface="Arial" panose="020B0604020202020204" pitchFamily="34" charset="0"/>
+              </a:rPr>
+              <a:t>Classifier</a:t>
+            </a:r>
+            <a:endParaRPr lang="en-US" sz="1050">
+              <a:solidFill>
+                <a:srgbClr val="C00000"/>
+              </a:solidFill>
+              <a:latin typeface="Arial" panose="020B0604020202020204" pitchFamily="34" charset="0"/>
+              <a:cs typeface="Arial" panose="020B0604020202020204" pitchFamily="34" charset="0"/>
+            </a:endParaRPr>
+          </a:p>
+        </p:txBody>
+      </p:sp>
+      <p:sp>
+        <p:nvSpPr>
+          <p:cNvPr id="19" name="Rectangle 18"/>
+          <p:cNvSpPr/>
+          <p:nvPr/>
+        </p:nvSpPr>
+        <p:spPr>
+          <a:xfrm>
+            <a:off x="5048801" y="3661545"/>
+            <a:ext cx="280894" cy="225467"/>
+          </a:xfrm>
+          <a:prstGeom prst="rect">
+            <a:avLst/>
+          </a:prstGeom>
+          <a:noFill/>
+          <a:ln>
+            <a:noFill/>
+          </a:ln>
+        </p:spPr>
+        <p:style>
+          <a:lnRef idx="2">
+            <a:schemeClr val="accent1">
+              <a:shade val="50000"/>
+            </a:schemeClr>
+          </a:lnRef>
+          <a:fillRef idx="1">
+            <a:schemeClr val="accent1"/>
+          </a:fillRef>
+          <a:effectRef idx="0">
+            <a:schemeClr val="accent1"/>
+          </a:effectRef>
+          <a:fontRef idx="minor">
+            <a:schemeClr val="lt1"/>
+          </a:fontRef>
+        </p:style>
+        <p:txBody>
+          <a:bodyPr rtlCol="0" anchor="ctr"/>
+          <a:lstStyle/>
+          <a:p>
+            <a:pPr algn="ctr"/>
+            <a:endParaRPr lang="en-US">
+              <a:solidFill>
+                <a:sysClr val="windowText" lastClr="000000"/>
+              </a:solidFill>
+            </a:endParaRPr>
+          </a:p>
+        </p:txBody>
+      </p:sp>
+      <p:sp>
+        <p:nvSpPr>
+          <p:cNvPr id="21" name="Rectangle 20"/>
+          <p:cNvSpPr/>
+          <p:nvPr/>
+        </p:nvSpPr>
+        <p:spPr>
+          <a:xfrm>
+            <a:off x="2188259" y="3271874"/>
+            <a:ext cx="280894" cy="225467"/>
+          </a:xfrm>
+          <a:prstGeom prst="rect">
+            <a:avLst/>
+          </a:prstGeom>
+          <a:noFill/>
+          <a:ln>
+            <a:noFill/>
+          </a:ln>
+        </p:spPr>
+        <p:style>
+          <a:lnRef idx="2">
+            <a:schemeClr val="accent1">
+              <a:shade val="50000"/>
+            </a:schemeClr>
+          </a:lnRef>
+          <a:fillRef idx="1">
+            <a:schemeClr val="accent1"/>
+          </a:fillRef>
+          <a:effectRef idx="0">
+            <a:schemeClr val="accent1"/>
+          </a:effectRef>
+          <a:fontRef idx="minor">
+            <a:schemeClr val="lt1"/>
+          </a:fontRef>
+        </p:style>
+        <p:txBody>
+          <a:bodyPr rtlCol="0" anchor="ctr"/>
+          <a:lstStyle/>
+          <a:p>
+            <a:pPr algn="ctr"/>
+            <a:endParaRPr lang="en-US"/>
+          </a:p>
+        </p:txBody>
+      </p:sp>
+      <p:pic>
+        <p:nvPicPr>
+          <p:cNvPr id="27" name="Picture 26"/>
+          <p:cNvPicPr>
+            <a:picLocks noChangeAspect="1"/>
+          </p:cNvPicPr>
+          <p:nvPr/>
+        </p:nvPicPr>
+        <p:blipFill>
+          <a:blip r:embed="rId4"/>
+          <a:stretch>
+            <a:fillRect/>
+          </a:stretch>
+        </p:blipFill>
+        <p:spPr>
+          <a:xfrm>
+            <a:off x="5909235" y="5431762"/>
+            <a:ext cx="3959514" cy="525053"/>
+          </a:xfrm>
+          <a:prstGeom prst="rect">
+            <a:avLst/>
+          </a:prstGeom>
+        </p:spPr>
+      </p:pic>
+      <p:cxnSp>
+        <p:nvCxnSpPr>
+          <p:cNvPr id="28" name="Elbow Connector 27"/>
+          <p:cNvCxnSpPr>
+            <a:stCxn id="30" idx="2"/>
+            <a:endCxn id="29" idx="0"/>
+          </p:cNvCxnSpPr>
+          <p:nvPr/>
+        </p:nvCxnSpPr>
+        <p:spPr>
+          <a:xfrm rot="16200000" flipH="1">
+            <a:off x="4668007" y="4633895"/>
+            <a:ext cx="985705" cy="1496752"/>
+          </a:xfrm>
+          <a:prstGeom prst="bentConnector3">
+            <a:avLst>
+              <a:gd name="adj1" fmla="val 100324"/>
+            </a:avLst>
+          </a:prstGeom>
+          <a:ln>
+            <a:tailEnd type="triangle"/>
+          </a:ln>
+        </p:spPr>
+        <p:style>
+          <a:lnRef idx="1">
+            <a:schemeClr val="accent1"/>
+          </a:lnRef>
+          <a:fillRef idx="0">
+            <a:schemeClr val="accent1"/>
+          </a:fillRef>
+          <a:effectRef idx="0">
+            <a:schemeClr val="accent1"/>
+          </a:effectRef>
+          <a:fontRef idx="minor">
+            <a:schemeClr val="tx1"/>
+          </a:fontRef>
+        </p:style>
+      </p:cxnSp>
+      <p:sp>
+        <p:nvSpPr>
+          <p:cNvPr id="29" name="Rectangle 28"/>
+          <p:cNvSpPr/>
+          <p:nvPr/>
+        </p:nvSpPr>
+        <p:spPr>
+          <a:xfrm>
+            <a:off x="5768788" y="5875124"/>
+            <a:ext cx="280894" cy="225467"/>
+          </a:xfrm>
+          <a:prstGeom prst="rect">
+            <a:avLst/>
+          </a:prstGeom>
+          <a:noFill/>
+          <a:ln>
+            <a:noFill/>
+          </a:ln>
+        </p:spPr>
+        <p:style>
+          <a:lnRef idx="2">
+            <a:schemeClr val="accent1">
+              <a:shade val="50000"/>
+            </a:schemeClr>
+          </a:lnRef>
+          <a:fillRef idx="1">
+            <a:schemeClr val="accent1"/>
+          </a:fillRef>
+          <a:effectRef idx="0">
+            <a:schemeClr val="accent1"/>
+          </a:effectRef>
+          <a:fontRef idx="minor">
+            <a:schemeClr val="lt1"/>
+          </a:fontRef>
+        </p:style>
+        <p:txBody>
+          <a:bodyPr rtlCol="0" anchor="ctr"/>
+          <a:lstStyle/>
+          <a:p>
+            <a:pPr algn="ctr"/>
+            <a:endParaRPr lang="en-US">
+              <a:solidFill>
+                <a:sysClr val="windowText" lastClr="000000"/>
+              </a:solidFill>
+            </a:endParaRPr>
+          </a:p>
+        </p:txBody>
+      </p:sp>
+      <p:sp>
+        <p:nvSpPr>
+          <p:cNvPr id="30" name="Rectangle 29"/>
+          <p:cNvSpPr/>
+          <p:nvPr/>
+        </p:nvSpPr>
+        <p:spPr>
+          <a:xfrm>
+            <a:off x="4272036" y="4663952"/>
+            <a:ext cx="280894" cy="225467"/>
+          </a:xfrm>
+          <a:prstGeom prst="rect">
+            <a:avLst/>
+          </a:prstGeom>
+          <a:noFill/>
+          <a:ln>
+            <a:noFill/>
+          </a:ln>
+        </p:spPr>
+        <p:style>
+          <a:lnRef idx="2">
+            <a:schemeClr val="accent1">
+              <a:shade val="50000"/>
+            </a:schemeClr>
+          </a:lnRef>
+          <a:fillRef idx="1">
+            <a:schemeClr val="accent1"/>
+          </a:fillRef>
+          <a:effectRef idx="0">
+            <a:schemeClr val="accent1"/>
+          </a:effectRef>
+          <a:fontRef idx="minor">
+            <a:schemeClr val="lt1"/>
+          </a:fontRef>
+        </p:style>
+        <p:txBody>
+          <a:bodyPr rtlCol="0" anchor="ctr"/>
+          <a:lstStyle/>
+          <a:p>
+            <a:pPr algn="ctr"/>
+            <a:endParaRPr lang="en-US"/>
+          </a:p>
+        </p:txBody>
+      </p:sp>
+      <p:sp>
+        <p:nvSpPr>
+          <p:cNvPr id="38" name="TextBox 37"/>
+          <p:cNvSpPr txBox="1"/>
+          <p:nvPr/>
+        </p:nvSpPr>
+        <p:spPr>
+          <a:xfrm>
+            <a:off x="6570712" y="5956815"/>
+            <a:ext cx="2636559" cy="253916"/>
+          </a:xfrm>
+          <a:prstGeom prst="rect">
+            <a:avLst/>
+          </a:prstGeom>
+          <a:noFill/>
+        </p:spPr>
+        <p:txBody>
+          <a:bodyPr wrap="square" rtlCol="0">
+            <a:spAutoFit/>
+          </a:bodyPr>
+          <a:lstStyle/>
+          <a:p>
+            <a:pPr algn="ctr"/>
+            <a:r>
+              <a:rPr lang="en-US" sz="1050" smtClean="0">
+                <a:solidFill>
+                  <a:srgbClr val="C00000"/>
+                </a:solidFill>
+                <a:latin typeface="Arial" panose="020B0604020202020204" pitchFamily="34" charset="0"/>
+                <a:cs typeface="Arial" panose="020B0604020202020204" pitchFamily="34" charset="0"/>
+              </a:rPr>
+              <a:t>Class predictions from our Classifier</a:t>
+            </a:r>
+            <a:endParaRPr lang="en-US" sz="1050">
+              <a:solidFill>
+                <a:srgbClr val="C00000"/>
+              </a:solidFill>
+              <a:latin typeface="Arial" panose="020B0604020202020204" pitchFamily="34" charset="0"/>
+              <a:cs typeface="Arial" panose="020B0604020202020204" pitchFamily="34" charset="0"/>
+            </a:endParaRPr>
+          </a:p>
+        </p:txBody>
+      </p:sp>
+      <p:sp>
+        <p:nvSpPr>
+          <p:cNvPr id="39" name="TextBox 38"/>
+          <p:cNvSpPr txBox="1"/>
+          <p:nvPr/>
+        </p:nvSpPr>
+        <p:spPr>
+          <a:xfrm>
+            <a:off x="7998053" y="3978221"/>
+            <a:ext cx="3201853" cy="577081"/>
+          </a:xfrm>
+          <a:prstGeom prst="rect">
+            <a:avLst/>
+          </a:prstGeom>
+          <a:noFill/>
+        </p:spPr>
+        <p:txBody>
+          <a:bodyPr wrap="square" rtlCol="0">
+            <a:spAutoFit/>
+          </a:bodyPr>
+          <a:lstStyle/>
+          <a:p>
+            <a:pPr algn="ctr"/>
+            <a:r>
+              <a:rPr lang="en-US" sz="1050" smtClean="0">
+                <a:solidFill>
+                  <a:srgbClr val="0070C0"/>
+                </a:solidFill>
+                <a:latin typeface="Arial" panose="020B0604020202020204" pitchFamily="34" charset="0"/>
+                <a:cs typeface="Arial" panose="020B0604020202020204" pitchFamily="34" charset="0"/>
+              </a:rPr>
+              <a:t>In this example the training data (emails) is used to develop the Classifier. However this is not a valid approach in an actual classification MLP.</a:t>
+            </a:r>
+            <a:endParaRPr lang="en-US" sz="1050">
+              <a:solidFill>
+                <a:srgbClr val="0070C0"/>
+              </a:solidFill>
+              <a:latin typeface="Arial" panose="020B0604020202020204" pitchFamily="34" charset="0"/>
+              <a:cs typeface="Arial" panose="020B0604020202020204" pitchFamily="34" charset="0"/>
+            </a:endParaRPr>
+          </a:p>
+        </p:txBody>
+      </p:sp>
     </p:spTree>
     <p:extLst>
       <p:ext uri="{BB962C8B-B14F-4D97-AF65-F5344CB8AC3E}">

</xml_diff>

<commit_message>
added curriculum file and reorganized folders
</commit_message>
<xml_diff>
--- a/Introduction-to-Machine-Learning/Introduction to Machine Learning.pptx
+++ b/Introduction-to-Machine-Learning/Introduction to Machine Learning.pptx
@@ -7,11 +7,7 @@
   <p:sldIdLst>
     <p:sldId id="256" r:id="rId2"/>
     <p:sldId id="257" r:id="rId3"/>
-    <p:sldId id="259" r:id="rId4"/>
-    <p:sldId id="263" r:id="rId5"/>
-    <p:sldId id="260" r:id="rId6"/>
-    <p:sldId id="261" r:id="rId7"/>
-    <p:sldId id="262" r:id="rId8"/>
+    <p:sldId id="260" r:id="rId4"/>
   </p:sldIdLst>
   <p:sldSz cx="12192000" cy="6858000"/>
   <p:notesSz cx="6858000" cy="9144000"/>
@@ -299,7 +295,7 @@
             <a:fld id="{B61BEF0D-F0BB-DE4B-95CE-6DB70DBA9567}" type="datetimeFigureOut">
               <a:rPr lang="en-US" smtClean="0"/>
               <a:pPr/>
-              <a:t>5/13/2019</a:t>
+              <a:t>5/15/2019</a:t>
             </a:fld>
             <a:endParaRPr lang="en-US" dirty="0"/>
           </a:p>
@@ -631,7 +627,7 @@
             <a:fld id="{B61BEF0D-F0BB-DE4B-95CE-6DB70DBA9567}" type="datetimeFigureOut">
               <a:rPr lang="en-US" smtClean="0"/>
               <a:pPr/>
-              <a:t>5/13/2019</a:t>
+              <a:t>5/15/2019</a:t>
             </a:fld>
             <a:endParaRPr lang="en-US" dirty="0"/>
           </a:p>
@@ -813,7 +809,7 @@
             <a:fld id="{B61BEF0D-F0BB-DE4B-95CE-6DB70DBA9567}" type="datetimeFigureOut">
               <a:rPr lang="en-US" smtClean="0"/>
               <a:pPr/>
-              <a:t>5/13/2019</a:t>
+              <a:t>5/15/2019</a:t>
             </a:fld>
             <a:endParaRPr lang="en-US" dirty="0"/>
           </a:p>
@@ -985,7 +981,7 @@
             <a:fld id="{B61BEF0D-F0BB-DE4B-95CE-6DB70DBA9567}" type="datetimeFigureOut">
               <a:rPr lang="en-US" smtClean="0"/>
               <a:pPr/>
-              <a:t>5/13/2019</a:t>
+              <a:t>5/15/2019</a:t>
             </a:fld>
             <a:endParaRPr lang="en-US" dirty="0"/>
           </a:p>
@@ -1264,7 +1260,7 @@
             <a:fld id="{B61BEF0D-F0BB-DE4B-95CE-6DB70DBA9567}" type="datetimeFigureOut">
               <a:rPr lang="en-US" smtClean="0"/>
               <a:pPr/>
-              <a:t>5/13/2019</a:t>
+              <a:t>5/15/2019</a:t>
             </a:fld>
             <a:endParaRPr lang="en-US" dirty="0"/>
           </a:p>
@@ -1660,7 +1656,7 @@
             <a:fld id="{B61BEF0D-F0BB-DE4B-95CE-6DB70DBA9567}" type="datetimeFigureOut">
               <a:rPr lang="en-US" smtClean="0"/>
               <a:pPr/>
-              <a:t>5/13/2019</a:t>
+              <a:t>5/15/2019</a:t>
             </a:fld>
             <a:endParaRPr lang="en-US" dirty="0"/>
           </a:p>
@@ -2139,7 +2135,7 @@
             <a:fld id="{B61BEF0D-F0BB-DE4B-95CE-6DB70DBA9567}" type="datetimeFigureOut">
               <a:rPr lang="en-US" smtClean="0"/>
               <a:pPr/>
-              <a:t>5/13/2019</a:t>
+              <a:t>5/15/2019</a:t>
             </a:fld>
             <a:endParaRPr lang="en-US" dirty="0"/>
           </a:p>
@@ -2259,7 +2255,7 @@
             <a:fld id="{B61BEF0D-F0BB-DE4B-95CE-6DB70DBA9567}" type="datetimeFigureOut">
               <a:rPr lang="en-US" smtClean="0"/>
               <a:pPr/>
-              <a:t>5/13/2019</a:t>
+              <a:t>5/15/2019</a:t>
             </a:fld>
             <a:endParaRPr lang="en-US" dirty="0"/>
           </a:p>
@@ -2356,7 +2352,7 @@
             <a:fld id="{B61BEF0D-F0BB-DE4B-95CE-6DB70DBA9567}" type="datetimeFigureOut">
               <a:rPr lang="en-US" smtClean="0"/>
               <a:pPr/>
-              <a:t>5/13/2019</a:t>
+              <a:t>5/15/2019</a:t>
             </a:fld>
             <a:endParaRPr lang="en-US" dirty="0"/>
           </a:p>
@@ -2704,7 +2700,7 @@
             <a:fld id="{B61BEF0D-F0BB-DE4B-95CE-6DB70DBA9567}" type="datetimeFigureOut">
               <a:rPr lang="en-US" smtClean="0"/>
               <a:pPr/>
-              <a:t>5/13/2019</a:t>
+              <a:t>5/15/2019</a:t>
             </a:fld>
             <a:endParaRPr lang="en-US" dirty="0"/>
           </a:p>
@@ -3094,7 +3090,7 @@
             <a:fld id="{B61BEF0D-F0BB-DE4B-95CE-6DB70DBA9567}" type="datetimeFigureOut">
               <a:rPr lang="en-US" smtClean="0"/>
               <a:pPr/>
-              <a:t>5/13/2019</a:t>
+              <a:t>5/15/2019</a:t>
             </a:fld>
             <a:endParaRPr lang="en-US" dirty="0"/>
           </a:p>
@@ -3374,7 +3370,7 @@
             <a:fld id="{B61BEF0D-F0BB-DE4B-95CE-6DB70DBA9567}" type="datetimeFigureOut">
               <a:rPr lang="en-US" smtClean="0"/>
               <a:pPr/>
-              <a:t>5/13/2019</a:t>
+              <a:t>5/15/2019</a:t>
             </a:fld>
             <a:endParaRPr lang="en-US" dirty="0"/>
           </a:p>
@@ -4111,704 +4107,48 @@
           <a:chExt cx="0" cy="0"/>
         </a:xfrm>
       </p:grpSpPr>
-      <p:sp>
-        <p:nvSpPr>
-          <p:cNvPr id="2" name="Title 1"/>
-          <p:cNvSpPr>
-            <a:spLocks noGrp="1"/>
-          </p:cNvSpPr>
-          <p:nvPr>
-            <p:ph type="title"/>
-          </p:nvPr>
-        </p:nvSpPr>
-        <p:spPr>
-          <a:xfrm>
-            <a:off x="1371600" y="685801"/>
-            <a:ext cx="9601200" cy="571500"/>
-          </a:xfrm>
-        </p:spPr>
-        <p:txBody>
-          <a:bodyPr>
-            <a:normAutofit fontScale="90000"/>
-          </a:bodyPr>
-          <a:lstStyle/>
-          <a:p>
-            <a:r>
-              <a:rPr lang="en-US" dirty="0">
-                <a:latin typeface="Arial Rounded MT Bold" panose="020F0704030504030204" pitchFamily="34" charset="0"/>
-              </a:rPr>
-              <a:t>What is Machine Learning?</a:t>
-            </a:r>
-          </a:p>
-        </p:txBody>
-      </p:sp>
-      <p:sp>
-        <p:nvSpPr>
-          <p:cNvPr id="3" name="TextBox 2"/>
-          <p:cNvSpPr txBox="1"/>
+      <p:pic>
+        <p:nvPicPr>
+          <p:cNvPr id="13" name="Picture 12"/>
+          <p:cNvPicPr>
+            <a:picLocks noChangeAspect="1"/>
+          </p:cNvPicPr>
           <p:nvPr/>
-        </p:nvSpPr>
-        <p:spPr>
-          <a:xfrm>
-            <a:off x="1371600" y="1380565"/>
-            <a:ext cx="9075271" cy="1461939"/>
+        </p:nvPicPr>
+        <p:blipFill>
+          <a:blip r:embed="rId2"/>
+          <a:stretch>
+            <a:fillRect/>
+          </a:stretch>
+        </p:blipFill>
+        <p:spPr>
+          <a:xfrm>
+            <a:off x="1410487" y="3277452"/>
+            <a:ext cx="1421945" cy="1978621"/>
           </a:xfrm>
           <a:prstGeom prst="rect">
             <a:avLst/>
           </a:prstGeom>
-          <a:noFill/>
-        </p:spPr>
-        <p:txBody>
-          <a:bodyPr wrap="square" rtlCol="0">
-            <a:spAutoFit/>
-          </a:bodyPr>
-          <a:lstStyle/>
-          <a:p>
-            <a:r>
-              <a:rPr lang="en-US" sz="1200" dirty="0"/>
-              <a:t>Machine Learning (ML) problems involve information with three characteristics:</a:t>
-            </a:r>
-          </a:p>
-          <a:p>
-            <a:pPr marL="573088" indent="-285750">
-              <a:spcBef>
-                <a:spcPts val="600"/>
-              </a:spcBef>
-              <a:buFont typeface="Wingdings" panose="05000000000000000000" pitchFamily="2" charset="2"/>
-              <a:buChar char="Ø"/>
-              <a:tabLst>
-                <a:tab pos="573088" algn="l"/>
-              </a:tabLst>
-            </a:pPr>
-            <a:r>
-              <a:rPr lang="en-US" sz="1200" dirty="0"/>
-              <a:t>	Observations		rows in a </a:t>
-            </a:r>
-            <a:r>
-              <a:rPr lang="en-US" sz="1200" dirty="0" err="1"/>
-              <a:t>dataframe</a:t>
-            </a:r>
-            <a:endParaRPr lang="en-US" sz="1200" dirty="0"/>
-          </a:p>
-          <a:p>
-            <a:pPr marL="573088" indent="-285750">
-              <a:buFont typeface="Wingdings" panose="05000000000000000000" pitchFamily="2" charset="2"/>
-              <a:buChar char="Ø"/>
-              <a:tabLst>
-                <a:tab pos="573088" algn="l"/>
-              </a:tabLst>
-            </a:pPr>
-            <a:r>
-              <a:rPr lang="en-US" sz="1200" dirty="0"/>
-              <a:t>	Features		input columns in a </a:t>
-            </a:r>
-            <a:r>
-              <a:rPr lang="en-US" sz="1200" dirty="0" err="1"/>
-              <a:t>dataframe</a:t>
-            </a:r>
-            <a:endParaRPr lang="en-US" sz="1200" dirty="0"/>
-          </a:p>
-          <a:p>
-            <a:pPr marL="573088" indent="-285750">
-              <a:buFont typeface="Wingdings" panose="05000000000000000000" pitchFamily="2" charset="2"/>
-              <a:buChar char="Ø"/>
-              <a:tabLst>
-                <a:tab pos="573088" algn="l"/>
-              </a:tabLst>
-            </a:pPr>
-            <a:r>
-              <a:rPr lang="en-US" sz="1200" dirty="0"/>
-              <a:t>	Labels			output column in a </a:t>
-            </a:r>
-            <a:r>
-              <a:rPr lang="en-US" sz="1200" dirty="0" err="1"/>
-              <a:t>dataframe</a:t>
-            </a:r>
-            <a:endParaRPr lang="en-US" sz="1200" dirty="0"/>
-          </a:p>
-          <a:p>
-            <a:pPr>
-              <a:tabLst>
-                <a:tab pos="573088" algn="l"/>
-              </a:tabLst>
-            </a:pPr>
-            <a:endParaRPr lang="en-US" sz="1200" dirty="0"/>
-          </a:p>
-          <a:p>
-            <a:pPr>
-              <a:tabLst>
-                <a:tab pos="573088" algn="l"/>
-              </a:tabLst>
-            </a:pPr>
-            <a:r>
-              <a:rPr lang="en-US" sz="1200" dirty="0"/>
-              <a:t>ML applies various algorithms to information to derive an estimated function. This estimated function’s parameters are tuned based on how the information’s feature values map to label values across a subset of observations within the information set.</a:t>
-            </a:r>
-          </a:p>
-        </p:txBody>
-      </p:sp>
-      <p:grpSp>
-        <p:nvGrpSpPr>
-          <p:cNvPr id="8" name="Group 7"/>
-          <p:cNvGrpSpPr/>
-          <p:nvPr/>
-        </p:nvGrpSpPr>
-        <p:grpSpPr>
-          <a:xfrm>
-            <a:off x="1371600" y="2904313"/>
-            <a:ext cx="9746766" cy="369332"/>
-            <a:chOff x="1279822" y="3765833"/>
-            <a:chExt cx="9746766" cy="369332"/>
-          </a:xfrm>
-        </p:grpSpPr>
-        <p:cxnSp>
-          <p:nvCxnSpPr>
-            <p:cNvPr id="5" name="Straight Connector 4"/>
-            <p:cNvCxnSpPr>
-              <a:stCxn id="6" idx="3"/>
-            </p:cNvCxnSpPr>
-            <p:nvPr/>
-          </p:nvCxnSpPr>
-          <p:spPr>
-            <a:xfrm>
-              <a:off x="4596243" y="3950499"/>
-              <a:ext cx="6430345" cy="0"/>
-            </a:xfrm>
-            <a:prstGeom prst="line">
-              <a:avLst/>
-            </a:prstGeom>
-          </p:spPr>
-          <p:style>
-            <a:lnRef idx="1">
-              <a:schemeClr val="accent1"/>
-            </a:lnRef>
-            <a:fillRef idx="0">
-              <a:schemeClr val="accent1"/>
-            </a:fillRef>
-            <a:effectRef idx="0">
-              <a:schemeClr val="accent1"/>
-            </a:effectRef>
-            <a:fontRef idx="minor">
-              <a:schemeClr val="tx1"/>
-            </a:fontRef>
-          </p:style>
-        </p:cxnSp>
-        <p:sp>
-          <p:nvSpPr>
-            <p:cNvPr id="6" name="TextBox 5"/>
-            <p:cNvSpPr txBox="1"/>
-            <p:nvPr/>
-          </p:nvSpPr>
-          <p:spPr>
-            <a:xfrm>
-              <a:off x="1279822" y="3765833"/>
-              <a:ext cx="3316421" cy="369332"/>
-            </a:xfrm>
-            <a:prstGeom prst="rect">
-              <a:avLst/>
-            </a:prstGeom>
-            <a:noFill/>
-          </p:spPr>
-          <p:txBody>
-            <a:bodyPr wrap="none" rtlCol="0">
-              <a:spAutoFit/>
-            </a:bodyPr>
-            <a:lstStyle/>
-            <a:p>
-              <a:r>
-                <a:rPr lang="en-US" b="1">
-                  <a:solidFill>
-                    <a:srgbClr val="00B0F0"/>
-                  </a:solidFill>
-                </a:rPr>
-                <a:t>Applied R (Studying Information)</a:t>
-              </a:r>
-            </a:p>
-          </p:txBody>
-        </p:sp>
-      </p:grpSp>
-      <p:sp>
-        <p:nvSpPr>
-          <p:cNvPr id="9" name="TextBox 8"/>
-          <p:cNvSpPr txBox="1"/>
-          <p:nvPr/>
-        </p:nvSpPr>
-        <p:spPr>
-          <a:xfrm>
-            <a:off x="1559859" y="3274566"/>
-            <a:ext cx="7183377" cy="769441"/>
-          </a:xfrm>
-          <a:prstGeom prst="rect">
-            <a:avLst/>
-          </a:prstGeom>
-          <a:noFill/>
-        </p:spPr>
-        <p:txBody>
-          <a:bodyPr wrap="none" rtlCol="0">
-            <a:spAutoFit/>
-          </a:bodyPr>
-          <a:lstStyle/>
-          <a:p>
-            <a:r>
-              <a:rPr lang="en-US" sz="1100" i="1">
-                <a:latin typeface="Consolas" panose="020B0609020204030204" pitchFamily="49" charset="0"/>
-              </a:rPr>
-              <a:t>dim</a:t>
-            </a:r>
-            <a:r>
-              <a:rPr lang="en-US" sz="1100">
-                <a:latin typeface="Consolas" panose="020B0609020204030204" pitchFamily="49" charset="0"/>
-              </a:rPr>
-              <a:t>(df)			</a:t>
-            </a:r>
-            <a:r>
-              <a:rPr lang="en-US" sz="1100">
-                <a:latin typeface="Consolas" panose="020B0609020204030204" pitchFamily="49" charset="0"/>
-                <a:sym typeface="Wingdings" panose="05000000000000000000" pitchFamily="2" charset="2"/>
-              </a:rPr>
-              <a:t> vector with the number of rows and columns in the dataframe (df)</a:t>
-            </a:r>
-          </a:p>
-          <a:p>
-            <a:r>
-              <a:rPr lang="en-US" sz="1100" i="1">
-                <a:latin typeface="Consolas" panose="020B0609020204030204" pitchFamily="49" charset="0"/>
-                <a:sym typeface="Wingdings" panose="05000000000000000000" pitchFamily="2" charset="2"/>
-              </a:rPr>
-              <a:t>str</a:t>
-            </a:r>
-            <a:r>
-              <a:rPr lang="en-US" sz="1100">
-                <a:latin typeface="Consolas" panose="020B0609020204030204" pitchFamily="49" charset="0"/>
-                <a:sym typeface="Wingdings" panose="05000000000000000000" pitchFamily="2" charset="2"/>
-              </a:rPr>
-              <a:t>(df)			 detailed information about the structure of df</a:t>
-            </a:r>
-          </a:p>
-          <a:p>
-            <a:r>
-              <a:rPr lang="en-US" sz="1100" i="1">
-                <a:latin typeface="Consolas" panose="020B0609020204030204" pitchFamily="49" charset="0"/>
-                <a:sym typeface="Wingdings" panose="05000000000000000000" pitchFamily="2" charset="2"/>
-              </a:rPr>
-              <a:t>head</a:t>
-            </a:r>
-            <a:r>
-              <a:rPr lang="en-US" sz="1100">
-                <a:latin typeface="Consolas" panose="020B0609020204030204" pitchFamily="49" charset="0"/>
-                <a:sym typeface="Wingdings" panose="05000000000000000000" pitchFamily="2" charset="2"/>
-              </a:rPr>
-              <a:t>(df) / </a:t>
-            </a:r>
-            <a:r>
-              <a:rPr lang="en-US" sz="1100" i="1">
-                <a:latin typeface="Consolas" panose="020B0609020204030204" pitchFamily="49" charset="0"/>
-                <a:sym typeface="Wingdings" panose="05000000000000000000" pitchFamily="2" charset="2"/>
-              </a:rPr>
-              <a:t>tail</a:t>
-            </a:r>
-            <a:r>
-              <a:rPr lang="en-US" sz="1100">
-                <a:latin typeface="Consolas" panose="020B0609020204030204" pitchFamily="49" charset="0"/>
-                <a:sym typeface="Wingdings" panose="05000000000000000000" pitchFamily="2" charset="2"/>
-              </a:rPr>
-              <a:t>(df)	 first / last six rows of df</a:t>
-            </a:r>
-          </a:p>
-          <a:p>
-            <a:r>
-              <a:rPr lang="en-US" sz="1100" i="1">
-                <a:latin typeface="Consolas" panose="020B0609020204030204" pitchFamily="49" charset="0"/>
-                <a:sym typeface="Wingdings" panose="05000000000000000000" pitchFamily="2" charset="2"/>
-              </a:rPr>
-              <a:t>summary</a:t>
-            </a:r>
-            <a:r>
-              <a:rPr lang="en-US" sz="1100">
-                <a:latin typeface="Consolas" panose="020B0609020204030204" pitchFamily="49" charset="0"/>
-                <a:sym typeface="Wingdings" panose="05000000000000000000" pitchFamily="2" charset="2"/>
-              </a:rPr>
-              <a:t>(df)			 statistical information for each column in df</a:t>
-            </a:r>
-          </a:p>
-        </p:txBody>
-      </p:sp>
-      <p:sp>
-        <p:nvSpPr>
-          <p:cNvPr id="10" name="TextBox 9"/>
-          <p:cNvSpPr txBox="1"/>
-          <p:nvPr/>
-        </p:nvSpPr>
-        <p:spPr>
-          <a:xfrm>
-            <a:off x="1371600" y="4191530"/>
-            <a:ext cx="9075271" cy="461665"/>
-          </a:xfrm>
-          <a:prstGeom prst="rect">
-            <a:avLst/>
-          </a:prstGeom>
-          <a:noFill/>
-        </p:spPr>
-        <p:txBody>
-          <a:bodyPr wrap="square" rtlCol="0">
-            <a:spAutoFit/>
-          </a:bodyPr>
-          <a:lstStyle/>
-          <a:p>
-            <a:r>
-              <a:rPr lang="en-US" sz="1200"/>
-              <a:t>One of the key goals of ML is making predictions about new observations based on previous information.</a:t>
-            </a:r>
-          </a:p>
-          <a:p>
-            <a:r>
-              <a:rPr lang="en-US" sz="1200"/>
-              <a:t>ML </a:t>
-            </a:r>
-            <a:r>
-              <a:rPr lang="en-US" sz="1200" b="1" u="sng"/>
-              <a:t>does not involve</a:t>
-            </a:r>
-            <a:r>
-              <a:rPr lang="en-US" sz="1200" b="1"/>
-              <a:t> </a:t>
-            </a:r>
-            <a:r>
-              <a:rPr lang="en-US" sz="1200"/>
-              <a:t>basic data manipulation and/or calculating statistics,</a:t>
-            </a:r>
-          </a:p>
-        </p:txBody>
-      </p:sp>
-      <p:grpSp>
-        <p:nvGrpSpPr>
-          <p:cNvPr id="11" name="Group 10"/>
-          <p:cNvGrpSpPr/>
-          <p:nvPr/>
-        </p:nvGrpSpPr>
-        <p:grpSpPr>
-          <a:xfrm>
-            <a:off x="1371600" y="4800718"/>
-            <a:ext cx="9746766" cy="369332"/>
-            <a:chOff x="1279822" y="3765833"/>
-            <a:chExt cx="9746766" cy="369332"/>
-          </a:xfrm>
-        </p:grpSpPr>
-        <p:cxnSp>
-          <p:nvCxnSpPr>
-            <p:cNvPr id="12" name="Straight Connector 11"/>
-            <p:cNvCxnSpPr>
-              <a:stCxn id="13" idx="3"/>
-            </p:cNvCxnSpPr>
-            <p:nvPr/>
-          </p:nvCxnSpPr>
-          <p:spPr>
-            <a:xfrm>
-              <a:off x="5212694" y="3950499"/>
-              <a:ext cx="5813894" cy="0"/>
-            </a:xfrm>
-            <a:prstGeom prst="line">
-              <a:avLst/>
-            </a:prstGeom>
-          </p:spPr>
-          <p:style>
-            <a:lnRef idx="1">
-              <a:schemeClr val="accent1"/>
-            </a:lnRef>
-            <a:fillRef idx="0">
-              <a:schemeClr val="accent1"/>
-            </a:fillRef>
-            <a:effectRef idx="0">
-              <a:schemeClr val="accent1"/>
-            </a:effectRef>
-            <a:fontRef idx="minor">
-              <a:schemeClr val="tx1"/>
-            </a:fontRef>
-          </p:style>
-        </p:cxnSp>
-        <p:sp>
-          <p:nvSpPr>
-            <p:cNvPr id="13" name="TextBox 12"/>
-            <p:cNvSpPr txBox="1"/>
-            <p:nvPr/>
-          </p:nvSpPr>
-          <p:spPr>
-            <a:xfrm>
-              <a:off x="1279822" y="3765833"/>
-              <a:ext cx="3932872" cy="369332"/>
-            </a:xfrm>
-            <a:prstGeom prst="rect">
-              <a:avLst/>
-            </a:prstGeom>
-            <a:noFill/>
-          </p:spPr>
-          <p:txBody>
-            <a:bodyPr wrap="none" rtlCol="0">
-              <a:spAutoFit/>
-            </a:bodyPr>
-            <a:lstStyle/>
-            <a:p>
-              <a:r>
-                <a:rPr lang="en-US" b="1">
-                  <a:solidFill>
-                    <a:srgbClr val="00B0F0"/>
-                  </a:solidFill>
-                </a:rPr>
-                <a:t>Applied R (Linear Regression Example)</a:t>
-              </a:r>
-            </a:p>
-          </p:txBody>
-        </p:sp>
-      </p:grpSp>
-      <p:sp>
-        <p:nvSpPr>
-          <p:cNvPr id="14" name="TextBox 13"/>
-          <p:cNvSpPr txBox="1"/>
-          <p:nvPr/>
-        </p:nvSpPr>
-        <p:spPr>
-          <a:xfrm>
-            <a:off x="1559859" y="5231860"/>
-            <a:ext cx="9260869" cy="769441"/>
-          </a:xfrm>
-          <a:prstGeom prst="rect">
-            <a:avLst/>
-          </a:prstGeom>
-          <a:noFill/>
-        </p:spPr>
-        <p:txBody>
-          <a:bodyPr wrap="none" rtlCol="0">
-            <a:spAutoFit/>
-          </a:bodyPr>
-          <a:lstStyle/>
-          <a:p>
-            <a:r>
-              <a:rPr lang="en-US" sz="1100">
-                <a:latin typeface="Consolas" panose="020B0609020204030204" pitchFamily="49" charset="0"/>
-              </a:rPr>
-              <a:t>Wage							</a:t>
-            </a:r>
-            <a:r>
-              <a:rPr lang="en-US" sz="1100">
-                <a:latin typeface="Consolas" panose="020B0609020204030204" pitchFamily="49" charset="0"/>
-                <a:sym typeface="Wingdings" panose="05000000000000000000" pitchFamily="2" charset="2"/>
-              </a:rPr>
-              <a:t> Use tools from Applied R (Studying Information) to study the Wage dataset</a:t>
-            </a:r>
-          </a:p>
-          <a:p>
-            <a:r>
-              <a:rPr lang="en-US" sz="1100">
-                <a:latin typeface="Consolas" panose="020B0609020204030204" pitchFamily="49" charset="0"/>
-                <a:sym typeface="Wingdings" panose="05000000000000000000" pitchFamily="2" charset="2"/>
-              </a:rPr>
-              <a:t>lm_wage</a:t>
-            </a:r>
-            <a:r>
-              <a:rPr lang="en-US" sz="1100" i="1">
-                <a:latin typeface="Consolas" panose="020B0609020204030204" pitchFamily="49" charset="0"/>
-                <a:sym typeface="Wingdings" panose="05000000000000000000" pitchFamily="2" charset="2"/>
-              </a:rPr>
-              <a:t> &lt;- lm(</a:t>
-            </a:r>
-            <a:r>
-              <a:rPr lang="en-US" sz="1100">
-                <a:latin typeface="Consolas" panose="020B0609020204030204" pitchFamily="49" charset="0"/>
-                <a:sym typeface="Wingdings" panose="05000000000000000000" pitchFamily="2" charset="2"/>
-              </a:rPr>
-              <a:t>wage</a:t>
-            </a:r>
-            <a:r>
-              <a:rPr lang="en-US" sz="1100" i="1">
-                <a:latin typeface="Consolas" panose="020B0609020204030204" pitchFamily="49" charset="0"/>
-                <a:sym typeface="Wingdings" panose="05000000000000000000" pitchFamily="2" charset="2"/>
-              </a:rPr>
-              <a:t> ~ </a:t>
-            </a:r>
-            <a:r>
-              <a:rPr lang="en-US" sz="1100">
-                <a:latin typeface="Consolas" panose="020B0609020204030204" pitchFamily="49" charset="0"/>
-                <a:sym typeface="Wingdings" panose="05000000000000000000" pitchFamily="2" charset="2"/>
-              </a:rPr>
-              <a:t>age</a:t>
-            </a:r>
-            <a:r>
-              <a:rPr lang="en-US" sz="1100" i="1">
-                <a:latin typeface="Consolas" panose="020B0609020204030204" pitchFamily="49" charset="0"/>
-                <a:sym typeface="Wingdings" panose="05000000000000000000" pitchFamily="2" charset="2"/>
-              </a:rPr>
-              <a:t>, </a:t>
-            </a:r>
-            <a:r>
-              <a:rPr lang="en-US" sz="1100">
-                <a:latin typeface="Consolas" panose="020B0609020204030204" pitchFamily="49" charset="0"/>
-                <a:sym typeface="Wingdings" panose="05000000000000000000" pitchFamily="2" charset="2"/>
-              </a:rPr>
-              <a:t>data</a:t>
-            </a:r>
-            <a:r>
-              <a:rPr lang="en-US" sz="1100" i="1">
-                <a:latin typeface="Consolas" panose="020B0609020204030204" pitchFamily="49" charset="0"/>
-                <a:sym typeface="Wingdings" panose="05000000000000000000" pitchFamily="2" charset="2"/>
-              </a:rPr>
-              <a:t> = </a:t>
-            </a:r>
-            <a:r>
-              <a:rPr lang="en-US" sz="1100">
-                <a:latin typeface="Consolas" panose="020B0609020204030204" pitchFamily="49" charset="0"/>
-                <a:sym typeface="Wingdings" panose="05000000000000000000" pitchFamily="2" charset="2"/>
-              </a:rPr>
-              <a:t>Wage</a:t>
-            </a:r>
-            <a:r>
-              <a:rPr lang="en-US" sz="1100" i="1">
-                <a:latin typeface="Consolas" panose="020B0609020204030204" pitchFamily="49" charset="0"/>
-                <a:sym typeface="Wingdings" panose="05000000000000000000" pitchFamily="2" charset="2"/>
-              </a:rPr>
-              <a:t>)</a:t>
-            </a:r>
-            <a:r>
-              <a:rPr lang="en-US" sz="1100">
-                <a:latin typeface="Consolas" panose="020B0609020204030204" pitchFamily="49" charset="0"/>
-                <a:sym typeface="Wingdings" panose="05000000000000000000" pitchFamily="2" charset="2"/>
-              </a:rPr>
-              <a:t>	 linear regression model on Wage that models wage as a function of age</a:t>
-            </a:r>
-          </a:p>
-          <a:p>
-            <a:r>
-              <a:rPr lang="en-US" sz="1100">
-                <a:latin typeface="Consolas" panose="020B0609020204030204" pitchFamily="49" charset="0"/>
-                <a:sym typeface="Wingdings" panose="05000000000000000000" pitchFamily="2" charset="2"/>
-              </a:rPr>
-              <a:t>unseen</a:t>
-            </a:r>
-            <a:r>
-              <a:rPr lang="en-US" sz="1100" i="1">
-                <a:latin typeface="Consolas" panose="020B0609020204030204" pitchFamily="49" charset="0"/>
-                <a:sym typeface="Wingdings" panose="05000000000000000000" pitchFamily="2" charset="2"/>
-              </a:rPr>
-              <a:t> &lt;- data.frame(</a:t>
-            </a:r>
-            <a:r>
-              <a:rPr lang="en-US" sz="1100">
-                <a:latin typeface="Consolas" panose="020B0609020204030204" pitchFamily="49" charset="0"/>
-                <a:sym typeface="Wingdings" panose="05000000000000000000" pitchFamily="2" charset="2"/>
-              </a:rPr>
-              <a:t>age</a:t>
-            </a:r>
-            <a:r>
-              <a:rPr lang="en-US" sz="1100" i="1">
-                <a:latin typeface="Consolas" panose="020B0609020204030204" pitchFamily="49" charset="0"/>
-                <a:sym typeface="Wingdings" panose="05000000000000000000" pitchFamily="2" charset="2"/>
-              </a:rPr>
-              <a:t> = 60)</a:t>
-            </a:r>
-            <a:r>
-              <a:rPr lang="en-US" sz="1100">
-                <a:latin typeface="Consolas" panose="020B0609020204030204" pitchFamily="49" charset="0"/>
-                <a:sym typeface="Wingdings" panose="05000000000000000000" pitchFamily="2" charset="2"/>
-              </a:rPr>
-              <a:t>		 unseen is a dataframe consisting of a new observation</a:t>
-            </a:r>
-          </a:p>
-          <a:p>
-            <a:r>
-              <a:rPr lang="en-US" sz="1100" i="1">
-                <a:latin typeface="Consolas" panose="020B0609020204030204" pitchFamily="49" charset="0"/>
-                <a:sym typeface="Wingdings" panose="05000000000000000000" pitchFamily="2" charset="2"/>
-              </a:rPr>
-              <a:t>predict(</a:t>
-            </a:r>
-            <a:r>
-              <a:rPr lang="en-US" sz="1100">
-                <a:latin typeface="Consolas" panose="020B0609020204030204" pitchFamily="49" charset="0"/>
-                <a:sym typeface="Wingdings" panose="05000000000000000000" pitchFamily="2" charset="2"/>
-              </a:rPr>
-              <a:t>lm_wage</a:t>
-            </a:r>
-            <a:r>
-              <a:rPr lang="en-US" sz="1100" i="1">
-                <a:latin typeface="Consolas" panose="020B0609020204030204" pitchFamily="49" charset="0"/>
-                <a:sym typeface="Wingdings" panose="05000000000000000000" pitchFamily="2" charset="2"/>
-              </a:rPr>
-              <a:t>, </a:t>
-            </a:r>
-            <a:r>
-              <a:rPr lang="en-US" sz="1100">
-                <a:latin typeface="Consolas" panose="020B0609020204030204" pitchFamily="49" charset="0"/>
-                <a:sym typeface="Wingdings" panose="05000000000000000000" pitchFamily="2" charset="2"/>
-              </a:rPr>
-              <a:t>unseen</a:t>
-            </a:r>
-            <a:r>
-              <a:rPr lang="en-US" sz="1100" i="1">
-                <a:latin typeface="Consolas" panose="020B0609020204030204" pitchFamily="49" charset="0"/>
-                <a:sym typeface="Wingdings" panose="05000000000000000000" pitchFamily="2" charset="2"/>
-              </a:rPr>
-              <a:t>)			</a:t>
-            </a:r>
-            <a:r>
-              <a:rPr lang="en-US" sz="1100">
-                <a:latin typeface="Consolas" panose="020B0609020204030204" pitchFamily="49" charset="0"/>
-                <a:sym typeface="Wingdings" panose="05000000000000000000" pitchFamily="2" charset="2"/>
-              </a:rPr>
-              <a:t> makes a prediction of wage based on age for the unseen observation</a:t>
-            </a:r>
-          </a:p>
-        </p:txBody>
-      </p:sp>
-      <p:sp>
-        <p:nvSpPr>
-          <p:cNvPr id="17" name="TextBox 16"/>
-          <p:cNvSpPr txBox="1"/>
-          <p:nvPr/>
-        </p:nvSpPr>
-        <p:spPr>
-          <a:xfrm>
-            <a:off x="659984" y="5855362"/>
-            <a:ext cx="899875" cy="415498"/>
-          </a:xfrm>
-          <a:prstGeom prst="rect">
-            <a:avLst/>
-          </a:prstGeom>
-          <a:noFill/>
-        </p:spPr>
-        <p:txBody>
-          <a:bodyPr wrap="square" rtlCol="0">
-            <a:spAutoFit/>
-          </a:bodyPr>
-          <a:lstStyle/>
-          <a:p>
-            <a:pPr algn="ctr"/>
-            <a:r>
-              <a:rPr lang="en-US" sz="1050">
-                <a:solidFill>
-                  <a:srgbClr val="C00000"/>
-                </a:solidFill>
-                <a:latin typeface="Arial" panose="020B0604020202020204" pitchFamily="34" charset="0"/>
-                <a:cs typeface="Arial" panose="020B0604020202020204" pitchFamily="34" charset="0"/>
-              </a:rPr>
-              <a:t>estimated function</a:t>
-            </a:r>
-          </a:p>
-        </p:txBody>
-      </p:sp>
+        </p:spPr>
+      </p:pic>
       <p:cxnSp>
         <p:nvCxnSpPr>
-          <p:cNvPr id="27" name="Straight Arrow Connector 26"/>
+          <p:cNvPr id="18" name="Elbow Connector 17"/>
           <p:cNvCxnSpPr>
-            <a:stCxn id="17" idx="0"/>
+            <a:stCxn id="21" idx="0"/>
+            <a:endCxn id="19" idx="0"/>
           </p:cNvCxnSpPr>
           <p:nvPr/>
         </p:nvCxnSpPr>
         <p:spPr>
-          <a:xfrm flipV="1">
-            <a:off x="1109922" y="5522259"/>
-            <a:ext cx="527631" cy="333103"/>
-          </a:xfrm>
-          <a:prstGeom prst="straightConnector1">
-            <a:avLst/>
+          <a:xfrm rot="16200000" flipH="1">
+            <a:off x="3564141" y="2036438"/>
+            <a:ext cx="389671" cy="2860542"/>
+          </a:xfrm>
+          <a:prstGeom prst="bentConnector3">
+            <a:avLst>
+              <a:gd name="adj1" fmla="val -29524"/>
+            </a:avLst>
           </a:prstGeom>
           <a:ln>
             <a:tailEnd type="triangle"/>
@@ -4831,285 +4171,6 @@
       </p:cxnSp>
       <p:sp>
         <p:nvSpPr>
-          <p:cNvPr id="32" name="TextBox 31"/>
-          <p:cNvSpPr txBox="1"/>
-          <p:nvPr/>
-        </p:nvSpPr>
-        <p:spPr>
-          <a:xfrm>
-            <a:off x="1801490" y="6270860"/>
-            <a:ext cx="899875" cy="253916"/>
-          </a:xfrm>
-          <a:prstGeom prst="rect">
-            <a:avLst/>
-          </a:prstGeom>
-          <a:noFill/>
-        </p:spPr>
-        <p:txBody>
-          <a:bodyPr wrap="square" rtlCol="0">
-            <a:spAutoFit/>
-          </a:bodyPr>
-          <a:lstStyle/>
-          <a:p>
-            <a:pPr algn="ctr"/>
-            <a:r>
-              <a:rPr lang="en-US" sz="1050">
-                <a:solidFill>
-                  <a:srgbClr val="C00000"/>
-                </a:solidFill>
-                <a:latin typeface="Arial" panose="020B0604020202020204" pitchFamily="34" charset="0"/>
-                <a:cs typeface="Arial" panose="020B0604020202020204" pitchFamily="34" charset="0"/>
-              </a:rPr>
-              <a:t>prediction</a:t>
-            </a:r>
-          </a:p>
-        </p:txBody>
-      </p:sp>
-      <p:cxnSp>
-        <p:nvCxnSpPr>
-          <p:cNvPr id="33" name="Straight Arrow Connector 32"/>
-          <p:cNvCxnSpPr>
-            <a:stCxn id="32" idx="0"/>
-          </p:cNvCxnSpPr>
-          <p:nvPr/>
-        </p:nvCxnSpPr>
-        <p:spPr>
-          <a:xfrm flipH="1" flipV="1">
-            <a:off x="1879184" y="5946588"/>
-            <a:ext cx="372244" cy="324272"/>
-          </a:xfrm>
-          <a:prstGeom prst="straightConnector1">
-            <a:avLst/>
-          </a:prstGeom>
-          <a:ln>
-            <a:tailEnd type="triangle"/>
-          </a:ln>
-        </p:spPr>
-        <p:style>
-          <a:lnRef idx="1">
-            <a:schemeClr val="accent1"/>
-          </a:lnRef>
-          <a:fillRef idx="0">
-            <a:schemeClr val="accent1"/>
-          </a:fillRef>
-          <a:effectRef idx="0">
-            <a:schemeClr val="accent1"/>
-          </a:effectRef>
-          <a:fontRef idx="minor">
-            <a:schemeClr val="tx1"/>
-          </a:fontRef>
-        </p:style>
-      </p:cxnSp>
-      <p:sp>
-        <p:nvSpPr>
-          <p:cNvPr id="36" name="TextBox 35"/>
-          <p:cNvSpPr txBox="1"/>
-          <p:nvPr/>
-        </p:nvSpPr>
-        <p:spPr>
-          <a:xfrm>
-            <a:off x="557533" y="6570090"/>
-            <a:ext cx="3015546" cy="253916"/>
-          </a:xfrm>
-          <a:prstGeom prst="rect">
-            <a:avLst/>
-          </a:prstGeom>
-          <a:noFill/>
-        </p:spPr>
-        <p:txBody>
-          <a:bodyPr wrap="square" rtlCol="0">
-            <a:spAutoFit/>
-          </a:bodyPr>
-          <a:lstStyle/>
-          <a:p>
-            <a:pPr algn="ctr"/>
-            <a:r>
-              <a:rPr lang="en-US" sz="1050">
-                <a:solidFill>
-                  <a:srgbClr val="C00000"/>
-                </a:solidFill>
-                <a:latin typeface="Arial" panose="020B0604020202020204" pitchFamily="34" charset="0"/>
-                <a:cs typeface="Arial" panose="020B0604020202020204" pitchFamily="34" charset="0"/>
-              </a:rPr>
-              <a:t>ingredients of a classical ML problem</a:t>
-            </a:r>
-          </a:p>
-        </p:txBody>
-      </p:sp>
-      <p:sp>
-        <p:nvSpPr>
-          <p:cNvPr id="37" name="TextBox 36"/>
-          <p:cNvSpPr txBox="1"/>
-          <p:nvPr/>
-        </p:nvSpPr>
-        <p:spPr>
-          <a:xfrm>
-            <a:off x="3788146" y="6269106"/>
-            <a:ext cx="899875" cy="415498"/>
-          </a:xfrm>
-          <a:prstGeom prst="rect">
-            <a:avLst/>
-          </a:prstGeom>
-          <a:noFill/>
-        </p:spPr>
-        <p:txBody>
-          <a:bodyPr wrap="square" rtlCol="0">
-            <a:spAutoFit/>
-          </a:bodyPr>
-          <a:lstStyle/>
-          <a:p>
-            <a:pPr algn="ctr"/>
-            <a:r>
-              <a:rPr lang="en-US" sz="1050">
-                <a:solidFill>
-                  <a:srgbClr val="C00000"/>
-                </a:solidFill>
-                <a:latin typeface="Arial" panose="020B0604020202020204" pitchFamily="34" charset="0"/>
-                <a:cs typeface="Arial" panose="020B0604020202020204" pitchFamily="34" charset="0"/>
-              </a:rPr>
-              <a:t>new obsevation</a:t>
-            </a:r>
-          </a:p>
-        </p:txBody>
-      </p:sp>
-      <p:cxnSp>
-        <p:nvCxnSpPr>
-          <p:cNvPr id="38" name="Straight Arrow Connector 37"/>
-          <p:cNvCxnSpPr>
-            <a:stCxn id="37" idx="0"/>
-          </p:cNvCxnSpPr>
-          <p:nvPr/>
-        </p:nvCxnSpPr>
-        <p:spPr>
-          <a:xfrm flipH="1" flipV="1">
-            <a:off x="3944054" y="5740170"/>
-            <a:ext cx="294030" cy="528936"/>
-          </a:xfrm>
-          <a:prstGeom prst="straightConnector1">
-            <a:avLst/>
-          </a:prstGeom>
-          <a:ln>
-            <a:tailEnd type="triangle"/>
-          </a:ln>
-        </p:spPr>
-        <p:style>
-          <a:lnRef idx="1">
-            <a:schemeClr val="accent1"/>
-          </a:lnRef>
-          <a:fillRef idx="0">
-            <a:schemeClr val="accent1"/>
-          </a:fillRef>
-          <a:effectRef idx="0">
-            <a:schemeClr val="accent1"/>
-          </a:effectRef>
-          <a:fontRef idx="minor">
-            <a:schemeClr val="tx1"/>
-          </a:fontRef>
-        </p:style>
-      </p:cxnSp>
-      <p:sp>
-        <p:nvSpPr>
-          <p:cNvPr id="40" name="TextBox 39"/>
-          <p:cNvSpPr txBox="1"/>
-          <p:nvPr/>
-        </p:nvSpPr>
-        <p:spPr>
-          <a:xfrm>
-            <a:off x="4801634" y="6272507"/>
-            <a:ext cx="899875" cy="415498"/>
-          </a:xfrm>
-          <a:prstGeom prst="rect">
-            <a:avLst/>
-          </a:prstGeom>
-          <a:noFill/>
-        </p:spPr>
-        <p:txBody>
-          <a:bodyPr wrap="square" rtlCol="0">
-            <a:spAutoFit/>
-          </a:bodyPr>
-          <a:lstStyle/>
-          <a:p>
-            <a:pPr algn="ctr"/>
-            <a:r>
-              <a:rPr lang="en-US" sz="1050">
-                <a:solidFill>
-                  <a:srgbClr val="C00000"/>
-                </a:solidFill>
-                <a:latin typeface="Arial" panose="020B0604020202020204" pitchFamily="34" charset="0"/>
-                <a:cs typeface="Arial" panose="020B0604020202020204" pitchFamily="34" charset="0"/>
-              </a:rPr>
-              <a:t>information set</a:t>
-            </a:r>
-          </a:p>
-        </p:txBody>
-      </p:sp>
-      <p:cxnSp>
-        <p:nvCxnSpPr>
-          <p:cNvPr id="41" name="Straight Arrow Connector 40"/>
-          <p:cNvCxnSpPr>
-            <a:stCxn id="40" idx="0"/>
-          </p:cNvCxnSpPr>
-          <p:nvPr/>
-        </p:nvCxnSpPr>
-        <p:spPr>
-          <a:xfrm flipH="1" flipV="1">
-            <a:off x="4273622" y="5626402"/>
-            <a:ext cx="977950" cy="646105"/>
-          </a:xfrm>
-          <a:prstGeom prst="straightConnector1">
-            <a:avLst/>
-          </a:prstGeom>
-          <a:ln>
-            <a:tailEnd type="triangle"/>
-          </a:ln>
-        </p:spPr>
-        <p:style>
-          <a:lnRef idx="1">
-            <a:schemeClr val="accent1"/>
-          </a:lnRef>
-          <a:fillRef idx="0">
-            <a:schemeClr val="accent1"/>
-          </a:fillRef>
-          <a:effectRef idx="0">
-            <a:schemeClr val="accent1"/>
-          </a:effectRef>
-          <a:fontRef idx="minor">
-            <a:schemeClr val="tx1"/>
-          </a:fontRef>
-        </p:style>
-      </p:cxnSp>
-    </p:spTree>
-    <p:extLst>
-      <p:ext uri="{BB962C8B-B14F-4D97-AF65-F5344CB8AC3E}">
-        <p14:creationId xmlns:p14="http://schemas.microsoft.com/office/powerpoint/2010/main" val="3308278282"/>
-      </p:ext>
-    </p:extLst>
-  </p:cSld>
-  <p:clrMapOvr>
-    <a:masterClrMapping/>
-  </p:clrMapOvr>
-</p:sld>
-</file>
-
-<file path=ppt/slides/slide4.xml><?xml version="1.0" encoding="utf-8"?>
-<p:sld xmlns:a="http://schemas.openxmlformats.org/drawingml/2006/main" xmlns:r="http://schemas.openxmlformats.org/officeDocument/2006/relationships" xmlns:p="http://schemas.openxmlformats.org/presentationml/2006/main">
-  <p:cSld>
-    <p:spTree>
-      <p:nvGrpSpPr>
-        <p:cNvPr id="1" name=""/>
-        <p:cNvGrpSpPr/>
-        <p:nvPr/>
-      </p:nvGrpSpPr>
-      <p:grpSpPr>
-        <a:xfrm>
-          <a:off x="0" y="0"/>
-          <a:ext cx="0" cy="0"/>
-          <a:chOff x="0" y="0"/>
-          <a:chExt cx="0" cy="0"/>
-        </a:xfrm>
-      </p:grpSpPr>
-      <p:sp>
-        <p:nvSpPr>
           <p:cNvPr id="2" name="Title 1"/>
           <p:cNvSpPr>
             <a:spLocks noGrp="1"/>
@@ -5120,225 +4181,7 @@
         </p:nvSpPr>
         <p:spPr>
           <a:xfrm>
-            <a:off x="1371600" y="685801"/>
-            <a:ext cx="9601200" cy="571500"/>
-          </a:xfrm>
-        </p:spPr>
-        <p:txBody>
-          <a:bodyPr>
-            <a:normAutofit fontScale="90000"/>
-          </a:bodyPr>
-          <a:lstStyle/>
-          <a:p>
-            <a:r>
-              <a:rPr lang="en-US" dirty="0">
-                <a:latin typeface="Arial Rounded MT Bold" panose="020F0704030504030204" pitchFamily="34" charset="0"/>
-              </a:rPr>
-              <a:t>Assessing Performance</a:t>
-            </a:r>
-          </a:p>
-        </p:txBody>
-      </p:sp>
-      <p:sp>
-        <p:nvSpPr>
-          <p:cNvPr id="22" name="TextBox 21">
-            <a:extLst>
-              <a:ext uri="{FF2B5EF4-FFF2-40B4-BE49-F238E27FC236}">
-                <a16:creationId xmlns:a16="http://schemas.microsoft.com/office/drawing/2014/main" id="{D2FA1DF5-118C-402C-9CE3-D89EB8221BBE}"/>
-              </a:ext>
-            </a:extLst>
-          </p:cNvPr>
-          <p:cNvSpPr txBox="1"/>
-          <p:nvPr/>
-        </p:nvSpPr>
-        <p:spPr>
-          <a:xfrm>
-            <a:off x="1371600" y="1380565"/>
-            <a:ext cx="9075271" cy="1015663"/>
-          </a:xfrm>
-          <a:prstGeom prst="rect">
-            <a:avLst/>
-          </a:prstGeom>
-          <a:noFill/>
-        </p:spPr>
-        <p:txBody>
-          <a:bodyPr wrap="square" rtlCol="0">
-            <a:spAutoFit/>
-          </a:bodyPr>
-          <a:lstStyle/>
-          <a:p>
-            <a:pPr marL="573088" indent="-285750">
-              <a:spcBef>
-                <a:spcPts val="600"/>
-              </a:spcBef>
-              <a:buFont typeface="Wingdings" panose="05000000000000000000" pitchFamily="2" charset="2"/>
-              <a:buChar char="Ø"/>
-              <a:tabLst>
-                <a:tab pos="573088" algn="l"/>
-              </a:tabLst>
-            </a:pPr>
-            <a:r>
-              <a:rPr lang="en-US" sz="1200" dirty="0"/>
-              <a:t>	Accuracy</a:t>
-            </a:r>
-          </a:p>
-          <a:p>
-            <a:pPr marL="573088" indent="-285750">
-              <a:buFont typeface="Wingdings" panose="05000000000000000000" pitchFamily="2" charset="2"/>
-              <a:buChar char="Ø"/>
-              <a:tabLst>
-                <a:tab pos="573088" algn="l"/>
-              </a:tabLst>
-            </a:pPr>
-            <a:r>
-              <a:rPr lang="en-US" sz="1200" dirty="0"/>
-              <a:t>	Computation time</a:t>
-            </a:r>
-          </a:p>
-          <a:p>
-            <a:pPr marL="573088" indent="-285750">
-              <a:buFont typeface="Wingdings" panose="05000000000000000000" pitchFamily="2" charset="2"/>
-              <a:buChar char="Ø"/>
-              <a:tabLst>
-                <a:tab pos="573088" algn="l"/>
-              </a:tabLst>
-            </a:pPr>
-            <a:r>
-              <a:rPr lang="en-US" sz="1200" dirty="0"/>
-              <a:t>	Interpretability</a:t>
-            </a:r>
-          </a:p>
-          <a:p>
-            <a:pPr>
-              <a:tabLst>
-                <a:tab pos="573088" algn="l"/>
-              </a:tabLst>
-            </a:pPr>
-            <a:endParaRPr lang="en-US" sz="1200" dirty="0"/>
-          </a:p>
-          <a:p>
-            <a:pPr>
-              <a:tabLst>
-                <a:tab pos="573088" algn="l"/>
-              </a:tabLst>
-            </a:pPr>
-            <a:r>
-              <a:rPr lang="en-US" sz="1200" dirty="0"/>
-              <a:t>Accuracy and Error are basic performance measures for Classification </a:t>
-            </a:r>
-            <a:r>
-              <a:rPr lang="en-US" sz="1200" dirty="0" err="1"/>
-              <a:t>MLP</a:t>
-            </a:r>
-            <a:endParaRPr lang="en-US" sz="1200" dirty="0"/>
-          </a:p>
-        </p:txBody>
-      </p:sp>
-    </p:spTree>
-    <p:extLst>
-      <p:ext uri="{BB962C8B-B14F-4D97-AF65-F5344CB8AC3E}">
-        <p14:creationId xmlns:p14="http://schemas.microsoft.com/office/powerpoint/2010/main" val="1934939991"/>
-      </p:ext>
-    </p:extLst>
-  </p:cSld>
-  <p:clrMapOvr>
-    <a:masterClrMapping/>
-  </p:clrMapOvr>
-</p:sld>
-</file>
-
-<file path=ppt/slides/slide5.xml><?xml version="1.0" encoding="utf-8"?>
-<p:sld xmlns:a="http://schemas.openxmlformats.org/drawingml/2006/main" xmlns:r="http://schemas.openxmlformats.org/officeDocument/2006/relationships" xmlns:p="http://schemas.openxmlformats.org/presentationml/2006/main">
-  <p:cSld>
-    <p:spTree>
-      <p:nvGrpSpPr>
-        <p:cNvPr id="1" name=""/>
-        <p:cNvGrpSpPr/>
-        <p:nvPr/>
-      </p:nvGrpSpPr>
-      <p:grpSpPr>
-        <a:xfrm>
-          <a:off x="0" y="0"/>
-          <a:ext cx="0" cy="0"/>
-          <a:chOff x="0" y="0"/>
-          <a:chExt cx="0" cy="0"/>
-        </a:xfrm>
-      </p:grpSpPr>
-      <p:pic>
-        <p:nvPicPr>
-          <p:cNvPr id="13" name="Picture 12"/>
-          <p:cNvPicPr>
-            <a:picLocks noChangeAspect="1"/>
-          </p:cNvPicPr>
-          <p:nvPr/>
-        </p:nvPicPr>
-        <p:blipFill>
-          <a:blip r:embed="rId2"/>
-          <a:stretch>
-            <a:fillRect/>
-          </a:stretch>
-        </p:blipFill>
-        <p:spPr>
-          <a:xfrm>
-            <a:off x="1410487" y="3277452"/>
-            <a:ext cx="1421945" cy="1978621"/>
-          </a:xfrm>
-          <a:prstGeom prst="rect">
-            <a:avLst/>
-          </a:prstGeom>
-        </p:spPr>
-      </p:pic>
-      <p:cxnSp>
-        <p:nvCxnSpPr>
-          <p:cNvPr id="18" name="Elbow Connector 17"/>
-          <p:cNvCxnSpPr>
-            <a:stCxn id="21" idx="0"/>
-            <a:endCxn id="19" idx="0"/>
-          </p:cNvCxnSpPr>
-          <p:nvPr/>
-        </p:nvCxnSpPr>
-        <p:spPr>
-          <a:xfrm rot="16200000" flipH="1">
-            <a:off x="3564141" y="2036438"/>
-            <a:ext cx="389671" cy="2860542"/>
-          </a:xfrm>
-          <a:prstGeom prst="bentConnector3">
-            <a:avLst>
-              <a:gd name="adj1" fmla="val -29524"/>
-            </a:avLst>
-          </a:prstGeom>
-          <a:ln>
-            <a:tailEnd type="triangle"/>
-          </a:ln>
-        </p:spPr>
-        <p:style>
-          <a:lnRef idx="1">
-            <a:schemeClr val="accent1"/>
-          </a:lnRef>
-          <a:fillRef idx="0">
-            <a:schemeClr val="accent1"/>
-          </a:fillRef>
-          <a:effectRef idx="0">
-            <a:schemeClr val="accent1"/>
-          </a:effectRef>
-          <a:fontRef idx="minor">
-            <a:schemeClr val="tx1"/>
-          </a:fontRef>
-        </p:style>
-      </p:cxnSp>
-      <p:sp>
-        <p:nvSpPr>
-          <p:cNvPr id="2" name="Title 1"/>
-          <p:cNvSpPr>
-            <a:spLocks noGrp="1"/>
-          </p:cNvSpPr>
-          <p:nvPr>
-            <p:ph type="title"/>
-          </p:nvPr>
-        </p:nvSpPr>
-        <p:spPr>
-          <a:xfrm>
-            <a:off x="731520" y="92408"/>
+            <a:off x="731520" y="274320"/>
             <a:ext cx="10972800" cy="594360"/>
           </a:xfrm>
         </p:spPr>
@@ -6025,413 +4868,6 @@
     <p:extLst>
       <p:ext uri="{BB962C8B-B14F-4D97-AF65-F5344CB8AC3E}">
         <p14:creationId xmlns:p14="http://schemas.microsoft.com/office/powerpoint/2010/main" val="344579914"/>
-      </p:ext>
-    </p:extLst>
-  </p:cSld>
-  <p:clrMapOvr>
-    <a:masterClrMapping/>
-  </p:clrMapOvr>
-</p:sld>
-</file>
-
-<file path=ppt/slides/slide6.xml><?xml version="1.0" encoding="utf-8"?>
-<p:sld xmlns:a="http://schemas.openxmlformats.org/drawingml/2006/main" xmlns:r="http://schemas.openxmlformats.org/officeDocument/2006/relationships" xmlns:p="http://schemas.openxmlformats.org/presentationml/2006/main">
-  <p:cSld>
-    <p:spTree>
-      <p:nvGrpSpPr>
-        <p:cNvPr id="1" name=""/>
-        <p:cNvGrpSpPr/>
-        <p:nvPr/>
-      </p:nvGrpSpPr>
-      <p:grpSpPr>
-        <a:xfrm>
-          <a:off x="0" y="0"/>
-          <a:ext cx="0" cy="0"/>
-          <a:chOff x="0" y="0"/>
-          <a:chExt cx="0" cy="0"/>
-        </a:xfrm>
-      </p:grpSpPr>
-      <p:sp>
-        <p:nvSpPr>
-          <p:cNvPr id="2" name="Title 1"/>
-          <p:cNvSpPr>
-            <a:spLocks noGrp="1"/>
-          </p:cNvSpPr>
-          <p:nvPr>
-            <p:ph type="title"/>
-          </p:nvPr>
-        </p:nvSpPr>
-        <p:spPr>
-          <a:xfrm>
-            <a:off x="1371600" y="685801"/>
-            <a:ext cx="9601200" cy="571500"/>
-          </a:xfrm>
-        </p:spPr>
-        <p:txBody>
-          <a:bodyPr>
-            <a:normAutofit fontScale="90000"/>
-          </a:bodyPr>
-          <a:lstStyle/>
-          <a:p>
-            <a:r>
-              <a:rPr lang="en-US">
-                <a:latin typeface="Arial Rounded MT Bold" panose="020F0704030504030204" pitchFamily="34" charset="0"/>
-              </a:rPr>
-              <a:t>Regression</a:t>
-            </a:r>
-          </a:p>
-        </p:txBody>
-      </p:sp>
-      <p:sp>
-        <p:nvSpPr>
-          <p:cNvPr id="3" name="TextBox 2"/>
-          <p:cNvSpPr txBox="1"/>
-          <p:nvPr/>
-        </p:nvSpPr>
-        <p:spPr>
-          <a:xfrm>
-            <a:off x="1371600" y="1380565"/>
-            <a:ext cx="9075271" cy="646331"/>
-          </a:xfrm>
-          <a:prstGeom prst="rect">
-            <a:avLst/>
-          </a:prstGeom>
-          <a:noFill/>
-        </p:spPr>
-        <p:txBody>
-          <a:bodyPr wrap="square" rtlCol="0">
-            <a:spAutoFit/>
-          </a:bodyPr>
-          <a:lstStyle/>
-          <a:p>
-            <a:r>
-              <a:rPr lang="en-US" sz="1200"/>
-              <a:t>Regression MLP attempt to estimate a </a:t>
-            </a:r>
-            <a:r>
-              <a:rPr lang="en-US" sz="1200" b="1"/>
-              <a:t>Response</a:t>
-            </a:r>
-            <a:r>
-              <a:rPr lang="en-US" sz="1200"/>
-              <a:t> value after a set of </a:t>
-            </a:r>
-            <a:r>
-              <a:rPr lang="en-US" sz="1200" b="1"/>
-              <a:t>Predictors</a:t>
-            </a:r>
-            <a:r>
-              <a:rPr lang="en-US" sz="1200"/>
-              <a:t> are pushed through a </a:t>
-            </a:r>
-            <a:r>
-              <a:rPr lang="en-US" sz="1200" b="1"/>
-              <a:t>Regression Function</a:t>
-            </a:r>
-            <a:r>
-              <a:rPr lang="en-US" sz="1200"/>
-              <a:t>.</a:t>
-            </a:r>
-          </a:p>
-          <a:p>
-            <a:endParaRPr lang="en-US" sz="1200"/>
-          </a:p>
-          <a:p>
-            <a:r>
-              <a:rPr lang="en-US" sz="1200"/>
-              <a:t>In linear regression, the regression function is estimated by two paramaters </a:t>
-            </a:r>
-            <a:r>
-              <a:rPr lang="en-US" sz="1200">
-                <a:latin typeface="Symbol" panose="05050102010706020507" pitchFamily="18" charset="2"/>
-              </a:rPr>
-              <a:t>b</a:t>
-            </a:r>
-            <a:r>
-              <a:rPr lang="en-US" sz="1200" baseline="-25000"/>
-              <a:t>0</a:t>
-            </a:r>
-            <a:r>
-              <a:rPr lang="en-US" sz="1200"/>
-              <a:t> and </a:t>
-            </a:r>
-            <a:r>
-              <a:rPr lang="en-US" sz="1200">
-                <a:latin typeface="Symbol" panose="05050102010706020507" pitchFamily="18" charset="2"/>
-              </a:rPr>
-              <a:t>b</a:t>
-            </a:r>
-            <a:r>
-              <a:rPr lang="en-US" sz="1200" baseline="-25000"/>
-              <a:t>1</a:t>
-            </a:r>
-            <a:endParaRPr lang="en-US" sz="1200"/>
-          </a:p>
-        </p:txBody>
-      </p:sp>
-      <p:grpSp>
-        <p:nvGrpSpPr>
-          <p:cNvPr id="8" name="Group 7"/>
-          <p:cNvGrpSpPr/>
-          <p:nvPr/>
-        </p:nvGrpSpPr>
-        <p:grpSpPr>
-          <a:xfrm>
-            <a:off x="1371600" y="2905234"/>
-            <a:ext cx="9746766" cy="369332"/>
-            <a:chOff x="1279822" y="3765833"/>
-            <a:chExt cx="9746766" cy="369332"/>
-          </a:xfrm>
-        </p:grpSpPr>
-        <p:cxnSp>
-          <p:nvCxnSpPr>
-            <p:cNvPr id="5" name="Straight Connector 4"/>
-            <p:cNvCxnSpPr>
-              <a:stCxn id="6" idx="3"/>
-            </p:cNvCxnSpPr>
-            <p:nvPr/>
-          </p:nvCxnSpPr>
-          <p:spPr>
-            <a:xfrm>
-              <a:off x="4596243" y="3950499"/>
-              <a:ext cx="6430345" cy="0"/>
-            </a:xfrm>
-            <a:prstGeom prst="line">
-              <a:avLst/>
-            </a:prstGeom>
-          </p:spPr>
-          <p:style>
-            <a:lnRef idx="1">
-              <a:schemeClr val="accent1"/>
-            </a:lnRef>
-            <a:fillRef idx="0">
-              <a:schemeClr val="accent1"/>
-            </a:fillRef>
-            <a:effectRef idx="0">
-              <a:schemeClr val="accent1"/>
-            </a:effectRef>
-            <a:fontRef idx="minor">
-              <a:schemeClr val="tx1"/>
-            </a:fontRef>
-          </p:style>
-        </p:cxnSp>
-        <p:sp>
-          <p:nvSpPr>
-            <p:cNvPr id="6" name="TextBox 5"/>
-            <p:cNvSpPr txBox="1"/>
-            <p:nvPr/>
-          </p:nvSpPr>
-          <p:spPr>
-            <a:xfrm>
-              <a:off x="1279822" y="3765833"/>
-              <a:ext cx="3316421" cy="369332"/>
-            </a:xfrm>
-            <a:prstGeom prst="rect">
-              <a:avLst/>
-            </a:prstGeom>
-            <a:noFill/>
-          </p:spPr>
-          <p:txBody>
-            <a:bodyPr wrap="none" rtlCol="0">
-              <a:spAutoFit/>
-            </a:bodyPr>
-            <a:lstStyle/>
-            <a:p>
-              <a:r>
-                <a:rPr lang="en-US" b="1">
-                  <a:solidFill>
-                    <a:srgbClr val="00B0F0"/>
-                  </a:solidFill>
-                </a:rPr>
-                <a:t>Applied R (Studying Information)</a:t>
-              </a:r>
-            </a:p>
-          </p:txBody>
-        </p:sp>
-      </p:grpSp>
-    </p:spTree>
-    <p:extLst>
-      <p:ext uri="{BB962C8B-B14F-4D97-AF65-F5344CB8AC3E}">
-        <p14:creationId xmlns:p14="http://schemas.microsoft.com/office/powerpoint/2010/main" val="3481709720"/>
-      </p:ext>
-    </p:extLst>
-  </p:cSld>
-  <p:clrMapOvr>
-    <a:masterClrMapping/>
-  </p:clrMapOvr>
-</p:sld>
-</file>
-
-<file path=ppt/slides/slide7.xml><?xml version="1.0" encoding="utf-8"?>
-<p:sld xmlns:a="http://schemas.openxmlformats.org/drawingml/2006/main" xmlns:r="http://schemas.openxmlformats.org/officeDocument/2006/relationships" xmlns:p="http://schemas.openxmlformats.org/presentationml/2006/main">
-  <p:cSld>
-    <p:spTree>
-      <p:nvGrpSpPr>
-        <p:cNvPr id="1" name=""/>
-        <p:cNvGrpSpPr/>
-        <p:nvPr/>
-      </p:nvGrpSpPr>
-      <p:grpSpPr>
-        <a:xfrm>
-          <a:off x="0" y="0"/>
-          <a:ext cx="0" cy="0"/>
-          <a:chOff x="0" y="0"/>
-          <a:chExt cx="0" cy="0"/>
-        </a:xfrm>
-      </p:grpSpPr>
-      <p:sp>
-        <p:nvSpPr>
-          <p:cNvPr id="2" name="Title 1"/>
-          <p:cNvSpPr>
-            <a:spLocks noGrp="1"/>
-          </p:cNvSpPr>
-          <p:nvPr>
-            <p:ph type="title"/>
-          </p:nvPr>
-        </p:nvSpPr>
-        <p:spPr>
-          <a:xfrm>
-            <a:off x="1371600" y="685801"/>
-            <a:ext cx="9601200" cy="571500"/>
-          </a:xfrm>
-        </p:spPr>
-        <p:txBody>
-          <a:bodyPr>
-            <a:normAutofit fontScale="90000"/>
-          </a:bodyPr>
-          <a:lstStyle/>
-          <a:p>
-            <a:r>
-              <a:rPr lang="en-US">
-                <a:latin typeface="Arial Rounded MT Bold" panose="020F0704030504030204" pitchFamily="34" charset="0"/>
-              </a:rPr>
-              <a:t>Clustering</a:t>
-            </a:r>
-          </a:p>
-        </p:txBody>
-      </p:sp>
-      <p:sp>
-        <p:nvSpPr>
-          <p:cNvPr id="3" name="TextBox 2"/>
-          <p:cNvSpPr txBox="1"/>
-          <p:nvPr/>
-        </p:nvSpPr>
-        <p:spPr>
-          <a:xfrm>
-            <a:off x="1371600" y="1380565"/>
-            <a:ext cx="9481671" cy="646331"/>
-          </a:xfrm>
-          <a:prstGeom prst="rect">
-            <a:avLst/>
-          </a:prstGeom>
-          <a:noFill/>
-        </p:spPr>
-        <p:txBody>
-          <a:bodyPr wrap="square" rtlCol="0">
-            <a:spAutoFit/>
-          </a:bodyPr>
-          <a:lstStyle/>
-          <a:p>
-            <a:r>
-              <a:rPr lang="en-US" sz="1200"/>
-              <a:t>Clustering MLP attempt to group similar objects in clusters while ensuring that each cluster is dissimilar from every other cluster.</a:t>
-            </a:r>
-          </a:p>
-          <a:p>
-            <a:endParaRPr lang="en-US" sz="1200"/>
-          </a:p>
-          <a:p>
-            <a:r>
-              <a:rPr lang="en-US" sz="1200"/>
-              <a:t>Clustering is similar to classification MLP however the important distinction is that in clustering, the classes, or clusters, are not predefined.</a:t>
-            </a:r>
-          </a:p>
-        </p:txBody>
-      </p:sp>
-      <p:grpSp>
-        <p:nvGrpSpPr>
-          <p:cNvPr id="8" name="Group 7"/>
-          <p:cNvGrpSpPr/>
-          <p:nvPr/>
-        </p:nvGrpSpPr>
-        <p:grpSpPr>
-          <a:xfrm>
-            <a:off x="1371600" y="2905234"/>
-            <a:ext cx="9746766" cy="369332"/>
-            <a:chOff x="1279822" y="3765833"/>
-            <a:chExt cx="9746766" cy="369332"/>
-          </a:xfrm>
-        </p:grpSpPr>
-        <p:cxnSp>
-          <p:nvCxnSpPr>
-            <p:cNvPr id="5" name="Straight Connector 4"/>
-            <p:cNvCxnSpPr>
-              <a:stCxn id="6" idx="3"/>
-            </p:cNvCxnSpPr>
-            <p:nvPr/>
-          </p:nvCxnSpPr>
-          <p:spPr>
-            <a:xfrm>
-              <a:off x="4596243" y="3950499"/>
-              <a:ext cx="6430345" cy="0"/>
-            </a:xfrm>
-            <a:prstGeom prst="line">
-              <a:avLst/>
-            </a:prstGeom>
-          </p:spPr>
-          <p:style>
-            <a:lnRef idx="1">
-              <a:schemeClr val="accent1"/>
-            </a:lnRef>
-            <a:fillRef idx="0">
-              <a:schemeClr val="accent1"/>
-            </a:fillRef>
-            <a:effectRef idx="0">
-              <a:schemeClr val="accent1"/>
-            </a:effectRef>
-            <a:fontRef idx="minor">
-              <a:schemeClr val="tx1"/>
-            </a:fontRef>
-          </p:style>
-        </p:cxnSp>
-        <p:sp>
-          <p:nvSpPr>
-            <p:cNvPr id="6" name="TextBox 5"/>
-            <p:cNvSpPr txBox="1"/>
-            <p:nvPr/>
-          </p:nvSpPr>
-          <p:spPr>
-            <a:xfrm>
-              <a:off x="1279822" y="3765833"/>
-              <a:ext cx="3316421" cy="369332"/>
-            </a:xfrm>
-            <a:prstGeom prst="rect">
-              <a:avLst/>
-            </a:prstGeom>
-            <a:noFill/>
-          </p:spPr>
-          <p:txBody>
-            <a:bodyPr wrap="none" rtlCol="0">
-              <a:spAutoFit/>
-            </a:bodyPr>
-            <a:lstStyle/>
-            <a:p>
-              <a:r>
-                <a:rPr lang="en-US" b="1">
-                  <a:solidFill>
-                    <a:srgbClr val="00B0F0"/>
-                  </a:solidFill>
-                </a:rPr>
-                <a:t>Applied R (Studying Information)</a:t>
-              </a:r>
-            </a:p>
-          </p:txBody>
-        </p:sp>
-      </p:grpSp>
-    </p:spTree>
-    <p:extLst>
-      <p:ext uri="{BB962C8B-B14F-4D97-AF65-F5344CB8AC3E}">
-        <p14:creationId xmlns:p14="http://schemas.microsoft.com/office/powerpoint/2010/main" val="931257476"/>
       </p:ext>
     </p:extLst>
   </p:cSld>

</xml_diff>